<commit_message>
File sharing enabled with video and image preview
</commit_message>
<xml_diff>
--- a/Talkdemy.pptx
+++ b/Talkdemy.pptx
@@ -203,7 +203,7 @@
           <a:p>
             <a:fld id="{27E14794-C7E3-4D2A-A147-5A79CA1729CE}" type="datetimeFigureOut">
               <a:rPr lang="en-US" smtClean="0"/>
-              <a:t>8/30/2025</a:t>
+              <a:t>11/8/2025</a:t>
             </a:fld>
             <a:endParaRPr lang="en-US"/>
           </a:p>
@@ -770,7 +770,7 @@
           <a:p>
             <a:fld id="{FE830DDE-36F6-4308-B673-936960E40F96}" type="datetime1">
               <a:rPr lang="en-US" smtClean="0"/>
-              <a:t>8/30/2025</a:t>
+              <a:t>11/8/2025</a:t>
             </a:fld>
             <a:endParaRPr lang="en-US"/>
           </a:p>
@@ -940,7 +940,7 @@
           <a:p>
             <a:fld id="{0A83C68B-41A4-41F5-B891-472D04403A57}" type="datetime1">
               <a:rPr lang="en-US" smtClean="0"/>
-              <a:t>8/30/2025</a:t>
+              <a:t>11/8/2025</a:t>
             </a:fld>
             <a:endParaRPr lang="en-US"/>
           </a:p>
@@ -1120,7 +1120,7 @@
           <a:p>
             <a:fld id="{CEED2026-1F0F-495E-A6A6-B65D9F4147CC}" type="datetime1">
               <a:rPr lang="en-US" smtClean="0"/>
-              <a:t>8/30/2025</a:t>
+              <a:t>11/8/2025</a:t>
             </a:fld>
             <a:endParaRPr lang="en-US"/>
           </a:p>
@@ -1290,7 +1290,7 @@
           <a:p>
             <a:fld id="{1848B3FF-4CA8-4C60-9B3B-8127512BAF51}" type="datetime1">
               <a:rPr lang="en-US" smtClean="0"/>
-              <a:t>8/30/2025</a:t>
+              <a:t>11/8/2025</a:t>
             </a:fld>
             <a:endParaRPr lang="en-US"/>
           </a:p>
@@ -1536,7 +1536,7 @@
           <a:p>
             <a:fld id="{E1255793-B380-447F-A6F1-4E670420F83A}" type="datetime1">
               <a:rPr lang="en-US" smtClean="0"/>
-              <a:t>8/30/2025</a:t>
+              <a:t>11/8/2025</a:t>
             </a:fld>
             <a:endParaRPr lang="en-US"/>
           </a:p>
@@ -1768,7 +1768,7 @@
           <a:p>
             <a:fld id="{13EE505F-3766-47D9-AC7B-BE0BFBB7EFD1}" type="datetime1">
               <a:rPr lang="en-US" smtClean="0"/>
-              <a:t>8/30/2025</a:t>
+              <a:t>11/8/2025</a:t>
             </a:fld>
             <a:endParaRPr lang="en-US"/>
           </a:p>
@@ -2135,7 +2135,7 @@
           <a:p>
             <a:fld id="{72BE841B-B1C4-4AFB-AA94-864F7286B14D}" type="datetime1">
               <a:rPr lang="en-US" smtClean="0"/>
-              <a:t>8/30/2025</a:t>
+              <a:t>11/8/2025</a:t>
             </a:fld>
             <a:endParaRPr lang="en-US"/>
           </a:p>
@@ -2253,7 +2253,7 @@
           <a:p>
             <a:fld id="{6751DA86-1FFB-4BF0-9A38-88EB68EF641C}" type="datetime1">
               <a:rPr lang="en-US" smtClean="0"/>
-              <a:t>8/30/2025</a:t>
+              <a:t>11/8/2025</a:t>
             </a:fld>
             <a:endParaRPr lang="en-US"/>
           </a:p>
@@ -2348,7 +2348,7 @@
           <a:p>
             <a:fld id="{51F87219-AD85-4DE6-A9FB-A5AC4C2B121E}" type="datetime1">
               <a:rPr lang="en-US" smtClean="0"/>
-              <a:t>8/30/2025</a:t>
+              <a:t>11/8/2025</a:t>
             </a:fld>
             <a:endParaRPr lang="en-US"/>
           </a:p>
@@ -2625,7 +2625,7 @@
           <a:p>
             <a:fld id="{D22E3C4A-76FD-404C-A3F8-268E15D298E7}" type="datetime1">
               <a:rPr lang="en-US" smtClean="0"/>
-              <a:t>8/30/2025</a:t>
+              <a:t>11/8/2025</a:t>
             </a:fld>
             <a:endParaRPr lang="en-US"/>
           </a:p>
@@ -2878,7 +2878,7 @@
           <a:p>
             <a:fld id="{6B6307BE-2E35-4CDF-8EAD-3D5B23D46522}" type="datetime1">
               <a:rPr lang="en-US" smtClean="0"/>
-              <a:t>8/30/2025</a:t>
+              <a:t>11/8/2025</a:t>
             </a:fld>
             <a:endParaRPr lang="en-US"/>
           </a:p>
@@ -3091,7 +3091,7 @@
           <a:p>
             <a:fld id="{938EBEEA-4474-4E6E-8922-C545FCF408EE}" type="datetime1">
               <a:rPr lang="en-US" smtClean="0"/>
-              <a:t>8/30/2025</a:t>
+              <a:t>11/8/2025</a:t>
             </a:fld>
             <a:endParaRPr lang="en-US"/>
           </a:p>
@@ -3959,15 +3959,19 @@
             </a:pPr>
             <a:r>
               <a:rPr lang="en-US" dirty="0"/>
-              <a:t>To design a user-friendly, real-time communication platform between teacher and student </a:t>
+              <a:t>To design </a:t>
             </a:r>
             <a:r>
               <a:rPr lang="en-US" dirty="0" smtClean="0"/>
-              <a:t>in a focused learning environment</a:t>
+              <a:t>a real-time </a:t>
+            </a:r>
+            <a:r>
+              <a:rPr lang="en-US" dirty="0"/>
+              <a:t>communication platform between teacher and student </a:t>
             </a:r>
             <a:r>
               <a:rPr lang="en-US" dirty="0" smtClean="0"/>
-              <a:t>.</a:t>
+              <a:t>in a focused learning environment.</a:t>
             </a:r>
             <a:endParaRPr lang="en-US" dirty="0"/>
           </a:p>
@@ -4250,7 +4254,6 @@
               <a:rPr lang="en-US" dirty="0" smtClean="0"/>
               <a:t>: socket.io</a:t>
             </a:r>
-            <a:endParaRPr lang="en-US" dirty="0" smtClean="0"/>
           </a:p>
           <a:p>
             <a:endParaRPr lang="en-US" dirty="0"/>

</xml_diff>